<commit_message>
Changed and optimized xgbproject using Optuna MC
</commit_message>
<xml_diff>
--- a/PID/ML/xgboostPlots/xgboostPerformance.pptx
+++ b/PID/ML/xgboostPlots/xgboostPerformance.pptx
@@ -20,6 +20,8 @@
     <p:sldId id="270" r:id="rId14"/>
     <p:sldId id="271" r:id="rId15"/>
     <p:sldId id="272" r:id="rId16"/>
+    <p:sldId id="273" r:id="rId17"/>
+    <p:sldId id="274" r:id="rId18"/>
   </p:sldIdLst>
   <p:sldSz cx="12192000" cy="6858000"/>
   <p:notesSz cx="6858000" cy="9144000"/>
@@ -275,7 +277,7 @@
           <a:p>
             <a:fld id="{2E1DF0C1-1ECF-264B-B877-C30491146F15}" type="datetimeFigureOut">
               <a:rPr lang="en-GB" smtClean="0"/>
-              <a:t>05/02/2025</a:t>
+              <a:t>07/02/2025</a:t>
             </a:fld>
             <a:endParaRPr lang="en-GB"/>
           </a:p>
@@ -475,7 +477,7 @@
           <a:p>
             <a:fld id="{2E1DF0C1-1ECF-264B-B877-C30491146F15}" type="datetimeFigureOut">
               <a:rPr lang="en-GB" smtClean="0"/>
-              <a:t>05/02/2025</a:t>
+              <a:t>07/02/2025</a:t>
             </a:fld>
             <a:endParaRPr lang="en-GB"/>
           </a:p>
@@ -685,7 +687,7 @@
           <a:p>
             <a:fld id="{2E1DF0C1-1ECF-264B-B877-C30491146F15}" type="datetimeFigureOut">
               <a:rPr lang="en-GB" smtClean="0"/>
-              <a:t>05/02/2025</a:t>
+              <a:t>07/02/2025</a:t>
             </a:fld>
             <a:endParaRPr lang="en-GB"/>
           </a:p>
@@ -885,7 +887,7 @@
           <a:p>
             <a:fld id="{2E1DF0C1-1ECF-264B-B877-C30491146F15}" type="datetimeFigureOut">
               <a:rPr lang="en-GB" smtClean="0"/>
-              <a:t>05/02/2025</a:t>
+              <a:t>07/02/2025</a:t>
             </a:fld>
             <a:endParaRPr lang="en-GB"/>
           </a:p>
@@ -1161,7 +1163,7 @@
           <a:p>
             <a:fld id="{2E1DF0C1-1ECF-264B-B877-C30491146F15}" type="datetimeFigureOut">
               <a:rPr lang="en-GB" smtClean="0"/>
-              <a:t>05/02/2025</a:t>
+              <a:t>07/02/2025</a:t>
             </a:fld>
             <a:endParaRPr lang="en-GB"/>
           </a:p>
@@ -1429,7 +1431,7 @@
           <a:p>
             <a:fld id="{2E1DF0C1-1ECF-264B-B877-C30491146F15}" type="datetimeFigureOut">
               <a:rPr lang="en-GB" smtClean="0"/>
-              <a:t>05/02/2025</a:t>
+              <a:t>07/02/2025</a:t>
             </a:fld>
             <a:endParaRPr lang="en-GB"/>
           </a:p>
@@ -1844,7 +1846,7 @@
           <a:p>
             <a:fld id="{2E1DF0C1-1ECF-264B-B877-C30491146F15}" type="datetimeFigureOut">
               <a:rPr lang="en-GB" smtClean="0"/>
-              <a:t>05/02/2025</a:t>
+              <a:t>07/02/2025</a:t>
             </a:fld>
             <a:endParaRPr lang="en-GB"/>
           </a:p>
@@ -1986,7 +1988,7 @@
           <a:p>
             <a:fld id="{2E1DF0C1-1ECF-264B-B877-C30491146F15}" type="datetimeFigureOut">
               <a:rPr lang="en-GB" smtClean="0"/>
-              <a:t>05/02/2025</a:t>
+              <a:t>07/02/2025</a:t>
             </a:fld>
             <a:endParaRPr lang="en-GB"/>
           </a:p>
@@ -2099,7 +2101,7 @@
           <a:p>
             <a:fld id="{2E1DF0C1-1ECF-264B-B877-C30491146F15}" type="datetimeFigureOut">
               <a:rPr lang="en-GB" smtClean="0"/>
-              <a:t>05/02/2025</a:t>
+              <a:t>07/02/2025</a:t>
             </a:fld>
             <a:endParaRPr lang="en-GB"/>
           </a:p>
@@ -2412,7 +2414,7 @@
           <a:p>
             <a:fld id="{2E1DF0C1-1ECF-264B-B877-C30491146F15}" type="datetimeFigureOut">
               <a:rPr lang="en-GB" smtClean="0"/>
-              <a:t>05/02/2025</a:t>
+              <a:t>07/02/2025</a:t>
             </a:fld>
             <a:endParaRPr lang="en-GB"/>
           </a:p>
@@ -2701,7 +2703,7 @@
           <a:p>
             <a:fld id="{2E1DF0C1-1ECF-264B-B877-C30491146F15}" type="datetimeFigureOut">
               <a:rPr lang="en-GB" smtClean="0"/>
-              <a:t>05/02/2025</a:t>
+              <a:t>07/02/2025</a:t>
             </a:fld>
             <a:endParaRPr lang="en-GB"/>
           </a:p>
@@ -2944,7 +2946,7 @@
           <a:p>
             <a:fld id="{2E1DF0C1-1ECF-264B-B877-C30491146F15}" type="datetimeFigureOut">
               <a:rPr lang="en-GB" smtClean="0"/>
-              <a:t>05/02/2025</a:t>
+              <a:t>07/02/2025</a:t>
             </a:fld>
             <a:endParaRPr lang="en-GB"/>
           </a:p>
@@ -3915,39 +3917,274 @@
           <a:bodyPr/>
           <a:lstStyle/>
           <a:p>
-            <a:endParaRPr lang="en-GB"/>
-          </a:p>
-        </p:txBody>
-      </p:sp>
-      <p:sp>
-        <p:nvSpPr>
-          <p:cNvPr id="3" name="Tijdelijke aanduiding voor inhoud 2">
-            <a:extLst>
-              <a:ext uri="{FF2B5EF4-FFF2-40B4-BE49-F238E27FC236}">
-                <a16:creationId xmlns:a16="http://schemas.microsoft.com/office/drawing/2014/main" id="{71F00D84-BEDA-6323-7CE0-3D97E7D49529}"/>
-              </a:ext>
-            </a:extLst>
-          </p:cNvPr>
-          <p:cNvSpPr>
-            <a:spLocks noGrp="1"/>
-          </p:cNvSpPr>
+            <a:r>
+              <a:rPr lang="en-GB" dirty="0" err="1"/>
+              <a:t>Prec</a:t>
+            </a:r>
+            <a:r>
+              <a:rPr lang="en-GB" dirty="0"/>
+              <a:t> Recall Threshold </a:t>
+            </a:r>
+          </a:p>
+        </p:txBody>
+      </p:sp>
+      <p:pic>
+        <p:nvPicPr>
+          <p:cNvPr id="5" name="Tijdelijke aanduiding voor inhoud 4" descr="Afbeelding met tekst, lijn, Perceel, diagram&#10;&#10;Door AI gegenereerde inhoud is mogelijk onjuist.">
+            <a:extLst>
+              <a:ext uri="{FF2B5EF4-FFF2-40B4-BE49-F238E27FC236}">
+                <a16:creationId xmlns:a16="http://schemas.microsoft.com/office/drawing/2014/main" id="{FFDC6DC0-C1CE-1CBF-D777-BA8D7DE9A6BC}"/>
+              </a:ext>
+            </a:extLst>
+          </p:cNvPr>
+          <p:cNvPicPr>
+            <a:picLocks noGrp="1" noChangeAspect="1"/>
+          </p:cNvPicPr>
           <p:nvPr>
             <p:ph idx="1"/>
           </p:nvPr>
-        </p:nvSpPr>
-        <p:spPr/>
-        <p:txBody>
-          <a:bodyPr/>
-          <a:lstStyle/>
-          <a:p>
-            <a:endParaRPr lang="en-GB"/>
-          </a:p>
-        </p:txBody>
-      </p:sp>
+        </p:nvPicPr>
+        <p:blipFill>
+          <a:blip r:embed="rId2"/>
+          <a:stretch>
+            <a:fillRect/>
+          </a:stretch>
+        </p:blipFill>
+        <p:spPr>
+          <a:xfrm>
+            <a:off x="2469885" y="1825625"/>
+            <a:ext cx="7252230" cy="4351338"/>
+          </a:xfrm>
+        </p:spPr>
+      </p:pic>
     </p:spTree>
     <p:extLst>
       <p:ext uri="{BB962C8B-B14F-4D97-AF65-F5344CB8AC3E}">
         <p14:creationId xmlns:p14="http://schemas.microsoft.com/office/powerpoint/2010/main" val="2794716402"/>
+      </p:ext>
+    </p:extLst>
+  </p:cSld>
+  <p:clrMapOvr>
+    <a:masterClrMapping/>
+  </p:clrMapOvr>
+</p:sld>
+</file>
+
+<file path=ppt/slides/slide16.xml><?xml version="1.0" encoding="utf-8"?>
+<p:sld xmlns:a="http://schemas.openxmlformats.org/drawingml/2006/main" xmlns:r="http://schemas.openxmlformats.org/officeDocument/2006/relationships" xmlns:p="http://schemas.openxmlformats.org/presentationml/2006/main">
+  <p:cSld>
+    <p:spTree>
+      <p:nvGrpSpPr>
+        <p:cNvPr id="1" name=""/>
+        <p:cNvGrpSpPr/>
+        <p:nvPr/>
+      </p:nvGrpSpPr>
+      <p:grpSpPr>
+        <a:xfrm>
+          <a:off x="0" y="0"/>
+          <a:ext cx="0" cy="0"/>
+          <a:chOff x="0" y="0"/>
+          <a:chExt cx="0" cy="0"/>
+        </a:xfrm>
+      </p:grpSpPr>
+      <p:sp>
+        <p:nvSpPr>
+          <p:cNvPr id="2" name="Titel 1">
+            <a:extLst>
+              <a:ext uri="{FF2B5EF4-FFF2-40B4-BE49-F238E27FC236}">
+                <a16:creationId xmlns:a16="http://schemas.microsoft.com/office/drawing/2014/main" id="{FFD51CF4-D8C0-3885-ABFE-B8D38BE76097}"/>
+              </a:ext>
+            </a:extLst>
+          </p:cNvPr>
+          <p:cNvSpPr>
+            <a:spLocks noGrp="1"/>
+          </p:cNvSpPr>
+          <p:nvPr>
+            <p:ph type="title"/>
+          </p:nvPr>
+        </p:nvSpPr>
+        <p:spPr/>
+        <p:txBody>
+          <a:bodyPr/>
+          <a:lstStyle/>
+          <a:p>
+            <a:endParaRPr lang="en-GB" dirty="0"/>
+          </a:p>
+        </p:txBody>
+      </p:sp>
+      <p:pic>
+        <p:nvPicPr>
+          <p:cNvPr id="5" name="Tijdelijke aanduiding voor inhoud 4" descr="Afbeelding met tekst, schermopname&#10;&#10;Door AI gegenereerde inhoud is mogelijk onjuist.">
+            <a:extLst>
+              <a:ext uri="{FF2B5EF4-FFF2-40B4-BE49-F238E27FC236}">
+                <a16:creationId xmlns:a16="http://schemas.microsoft.com/office/drawing/2014/main" id="{83F1FA6F-D942-2EFA-3371-A4E9E020A77C}"/>
+              </a:ext>
+            </a:extLst>
+          </p:cNvPr>
+          <p:cNvPicPr>
+            <a:picLocks noGrp="1" noChangeAspect="1"/>
+          </p:cNvPicPr>
+          <p:nvPr>
+            <p:ph idx="1"/>
+          </p:nvPr>
+        </p:nvPicPr>
+        <p:blipFill>
+          <a:blip r:embed="rId2"/>
+          <a:stretch>
+            <a:fillRect/>
+          </a:stretch>
+        </p:blipFill>
+        <p:spPr>
+          <a:xfrm>
+            <a:off x="240784" y="26332"/>
+            <a:ext cx="5753726" cy="3482082"/>
+          </a:xfrm>
+        </p:spPr>
+      </p:pic>
+      <p:pic>
+        <p:nvPicPr>
+          <p:cNvPr id="7" name="Afbeelding 6" descr="Afbeelding met tekst, lijn, diagram, Perceel&#10;&#10;Door AI gegenereerde inhoud is mogelijk onjuist.">
+            <a:extLst>
+              <a:ext uri="{FF2B5EF4-FFF2-40B4-BE49-F238E27FC236}">
+                <a16:creationId xmlns:a16="http://schemas.microsoft.com/office/drawing/2014/main" id="{53D49C51-A575-935C-4055-09BBBA88570B}"/>
+              </a:ext>
+            </a:extLst>
+          </p:cNvPr>
+          <p:cNvPicPr>
+            <a:picLocks noChangeAspect="1"/>
+          </p:cNvPicPr>
+          <p:nvPr/>
+        </p:nvPicPr>
+        <p:blipFill>
+          <a:blip r:embed="rId3"/>
+          <a:stretch>
+            <a:fillRect/>
+          </a:stretch>
+        </p:blipFill>
+        <p:spPr>
+          <a:xfrm>
+            <a:off x="3725845" y="3508414"/>
+            <a:ext cx="4740309" cy="3104484"/>
+          </a:xfrm>
+          <a:prstGeom prst="rect">
+            <a:avLst/>
+          </a:prstGeom>
+        </p:spPr>
+      </p:pic>
+      <p:pic>
+        <p:nvPicPr>
+          <p:cNvPr id="9" name="Afbeelding 8" descr="Afbeelding met lijn, schermopname, tekst, diagram&#10;&#10;Door AI gegenereerde inhoud is mogelijk onjuist.">
+            <a:extLst>
+              <a:ext uri="{FF2B5EF4-FFF2-40B4-BE49-F238E27FC236}">
+                <a16:creationId xmlns:a16="http://schemas.microsoft.com/office/drawing/2014/main" id="{D02AA106-BB40-6CF6-C0AD-D98743C325F1}"/>
+              </a:ext>
+            </a:extLst>
+          </p:cNvPr>
+          <p:cNvPicPr>
+            <a:picLocks noChangeAspect="1"/>
+          </p:cNvPicPr>
+          <p:nvPr/>
+        </p:nvPicPr>
+        <p:blipFill>
+          <a:blip r:embed="rId4"/>
+          <a:stretch>
+            <a:fillRect/>
+          </a:stretch>
+        </p:blipFill>
+        <p:spPr>
+          <a:xfrm>
+            <a:off x="6197492" y="26331"/>
+            <a:ext cx="5491355" cy="3493495"/>
+          </a:xfrm>
+          <a:prstGeom prst="rect">
+            <a:avLst/>
+          </a:prstGeom>
+        </p:spPr>
+      </p:pic>
+    </p:spTree>
+    <p:extLst>
+      <p:ext uri="{BB962C8B-B14F-4D97-AF65-F5344CB8AC3E}">
+        <p14:creationId xmlns:p14="http://schemas.microsoft.com/office/powerpoint/2010/main" val="2238331096"/>
+      </p:ext>
+    </p:extLst>
+  </p:cSld>
+  <p:clrMapOvr>
+    <a:masterClrMapping/>
+  </p:clrMapOvr>
+</p:sld>
+</file>
+
+<file path=ppt/slides/slide17.xml><?xml version="1.0" encoding="utf-8"?>
+<p:sld xmlns:a="http://schemas.openxmlformats.org/drawingml/2006/main" xmlns:r="http://schemas.openxmlformats.org/officeDocument/2006/relationships" xmlns:p="http://schemas.openxmlformats.org/presentationml/2006/main">
+  <p:cSld>
+    <p:spTree>
+      <p:nvGrpSpPr>
+        <p:cNvPr id="1" name=""/>
+        <p:cNvGrpSpPr/>
+        <p:nvPr/>
+      </p:nvGrpSpPr>
+      <p:grpSpPr>
+        <a:xfrm>
+          <a:off x="0" y="0"/>
+          <a:ext cx="0" cy="0"/>
+          <a:chOff x="0" y="0"/>
+          <a:chExt cx="0" cy="0"/>
+        </a:xfrm>
+      </p:grpSpPr>
+      <p:sp>
+        <p:nvSpPr>
+          <p:cNvPr id="2" name="Titel 1">
+            <a:extLst>
+              <a:ext uri="{FF2B5EF4-FFF2-40B4-BE49-F238E27FC236}">
+                <a16:creationId xmlns:a16="http://schemas.microsoft.com/office/drawing/2014/main" id="{6B6C6990-8694-B4D5-A9BF-462220E192B6}"/>
+              </a:ext>
+            </a:extLst>
+          </p:cNvPr>
+          <p:cNvSpPr>
+            <a:spLocks noGrp="1"/>
+          </p:cNvSpPr>
+          <p:nvPr>
+            <p:ph type="title"/>
+          </p:nvPr>
+        </p:nvSpPr>
+        <p:spPr/>
+        <p:txBody>
+          <a:bodyPr/>
+          <a:lstStyle/>
+          <a:p>
+            <a:endParaRPr lang="en-GB"/>
+          </a:p>
+        </p:txBody>
+      </p:sp>
+      <p:sp>
+        <p:nvSpPr>
+          <p:cNvPr id="3" name="Tijdelijke aanduiding voor inhoud 2">
+            <a:extLst>
+              <a:ext uri="{FF2B5EF4-FFF2-40B4-BE49-F238E27FC236}">
+                <a16:creationId xmlns:a16="http://schemas.microsoft.com/office/drawing/2014/main" id="{C2D14951-82AB-53A2-652D-534C9CFD3D0B}"/>
+              </a:ext>
+            </a:extLst>
+          </p:cNvPr>
+          <p:cNvSpPr>
+            <a:spLocks noGrp="1"/>
+          </p:cNvSpPr>
+          <p:nvPr>
+            <p:ph idx="1"/>
+          </p:nvPr>
+        </p:nvSpPr>
+        <p:spPr/>
+        <p:txBody>
+          <a:bodyPr/>
+          <a:lstStyle/>
+          <a:p>
+            <a:endParaRPr lang="en-GB"/>
+          </a:p>
+        </p:txBody>
+      </p:sp>
+    </p:spTree>
+    <p:extLst>
+      <p:ext uri="{BB962C8B-B14F-4D97-AF65-F5344CB8AC3E}">
+        <p14:creationId xmlns:p14="http://schemas.microsoft.com/office/powerpoint/2010/main" val="2442961089"/>
       </p:ext>
     </p:extLst>
   </p:cSld>

</xml_diff>